<commit_message>
added algorithm B flowshart
</commit_message>
<xml_diff>
--- a/Presentation.pptx
+++ b/Presentation.pptx
@@ -220,7 +220,7 @@
           <a:p>
             <a:fld id="{8F591CCF-F6FD-734B-854A-5BC033593B1E}" type="datetimeFigureOut">
               <a:rPr lang="nl-NL" smtClean="0"/>
-              <a:t>3-5-2019</a:t>
+              <a:t>5-5-2019</a:t>
             </a:fld>
             <a:endParaRPr lang="nl-NL"/>
           </a:p>
@@ -385,7 +385,7 @@
           <a:p>
             <a:fld id="{23C66214-DB21-4647-B5DA-0D17CA592867}" type="datetimeFigureOut">
               <a:rPr lang="nl-NL" smtClean="0"/>
-              <a:t>3-5-2019</a:t>
+              <a:t>5-5-2019</a:t>
             </a:fld>
             <a:endParaRPr lang="nl-NL"/>
           </a:p>
@@ -2734,7 +2734,7 @@
           <a:p>
             <a:fld id="{57D7C714-5F48-450F-A8AA-4074489DE35D}" type="datetime1">
               <a:rPr lang="nl-BE" smtClean="0"/>
-              <a:t>3/05/2019</a:t>
+              <a:t>5/05/2019</a:t>
             </a:fld>
             <a:endParaRPr lang="nl-NL"/>
           </a:p>
@@ -3017,7 +3017,7 @@
           <a:p>
             <a:fld id="{ED45BF64-0C64-4305-9727-1A6BC5E7FD44}" type="datetime1">
               <a:rPr lang="nl-BE" smtClean="0"/>
-              <a:t>3/05/2019</a:t>
+              <a:t>5/05/2019</a:t>
             </a:fld>
             <a:endParaRPr lang="nl-NL"/>
           </a:p>
@@ -3347,7 +3347,7 @@
           <a:p>
             <a:fld id="{0B1ECB4D-6672-4D24-937D-2A64AB6AA9E8}" type="datetime1">
               <a:rPr lang="nl-BE" smtClean="0"/>
-              <a:t>3/05/2019</a:t>
+              <a:t>5/05/2019</a:t>
             </a:fld>
             <a:endParaRPr lang="nl-NL"/>
           </a:p>
@@ -3666,7 +3666,7 @@
           <a:p>
             <a:fld id="{06B801E4-D607-4193-80DC-04D95F693075}" type="datetime1">
               <a:rPr lang="nl-BE" smtClean="0"/>
-              <a:t>3/05/2019</a:t>
+              <a:t>5/05/2019</a:t>
             </a:fld>
             <a:endParaRPr lang="nl-NL" dirty="0"/>
           </a:p>
@@ -3987,7 +3987,7 @@
           <a:p>
             <a:fld id="{2FE9E6F2-FD3C-443A-9915-67C5D4A778AB}" type="datetime1">
               <a:rPr lang="nl-BE" smtClean="0"/>
-              <a:t>3/05/2019</a:t>
+              <a:t>5/05/2019</a:t>
             </a:fld>
             <a:endParaRPr lang="nl-NL" dirty="0"/>
           </a:p>
@@ -4129,7 +4129,7 @@
           <a:p>
             <a:fld id="{81878F53-468C-448F-922A-461E164F81DA}" type="datetime1">
               <a:rPr lang="nl-BE" smtClean="0"/>
-              <a:t>3/05/2019</a:t>
+              <a:t>5/05/2019</a:t>
             </a:fld>
             <a:endParaRPr lang="nl-NL"/>
           </a:p>
@@ -4613,7 +4613,7 @@
           <a:p>
             <a:fld id="{39F85370-35FB-4BD7-A74D-3CDA3105C7D1}" type="datetime1">
               <a:rPr lang="nl-BE" smtClean="0"/>
-              <a:t>3/05/2019</a:t>
+              <a:t>5/05/2019</a:t>
             </a:fld>
             <a:endParaRPr lang="nl-NL" dirty="0"/>
           </a:p>
@@ -4734,7 +4734,7 @@
           <a:p>
             <a:fld id="{D9BE8693-E707-499B-8FFF-66CE3A1472B6}" type="datetime1">
               <a:rPr lang="nl-BE" smtClean="0"/>
-              <a:t>3/05/2019</a:t>
+              <a:t>5/05/2019</a:t>
             </a:fld>
             <a:endParaRPr lang="nl-NL"/>
           </a:p>
@@ -4855,7 +4855,7 @@
           <a:p>
             <a:fld id="{6E3FDF50-4E06-408D-96D3-984F4B2F1002}" type="datetime1">
               <a:rPr lang="nl-BE" smtClean="0"/>
-              <a:t>3/05/2019</a:t>
+              <a:t>5/05/2019</a:t>
             </a:fld>
             <a:endParaRPr lang="nl-NL"/>
           </a:p>
@@ -5037,7 +5037,7 @@
           <a:p>
             <a:fld id="{D201CDD3-2AE7-4E55-B42C-25EB2030EB50}" type="datetime1">
               <a:rPr lang="nl-BE" smtClean="0"/>
-              <a:t>3/05/2019</a:t>
+              <a:t>5/05/2019</a:t>
             </a:fld>
             <a:endParaRPr lang="nl-NL" dirty="0"/>
           </a:p>
@@ -5321,7 +5321,7 @@
           <a:p>
             <a:fld id="{80F1C81A-592B-49EC-AAC7-727D7A7A9B35}" type="datetime1">
               <a:rPr lang="nl-BE" smtClean="0"/>
-              <a:t>3/05/2019</a:t>
+              <a:t>5/05/2019</a:t>
             </a:fld>
             <a:endParaRPr lang="nl-NL" dirty="0"/>
           </a:p>
@@ -5962,7 +5962,7 @@
           <a:p>
             <a:fld id="{D51AC276-9A93-4CC9-81F5-4CBF76887AFA}" type="datetime1">
               <a:rPr lang="nl-BE" smtClean="0"/>
-              <a:t>3/05/2019</a:t>
+              <a:t>5/05/2019</a:t>
             </a:fld>
             <a:endParaRPr lang="nl-NL" dirty="0"/>
           </a:p>
@@ -6641,7 +6641,7 @@
           <a:bodyPr/>
           <a:lstStyle/>
           <a:p>
-            <a:endParaRPr lang="en-BE"/>
+            <a:endParaRPr lang="en-BE" dirty="0"/>
           </a:p>
         </p:txBody>
       </p:sp>
@@ -6731,6 +6731,1155 @@
           </a:p>
         </p:txBody>
       </p:sp>
+      <p:sp>
+        <p:nvSpPr>
+          <p:cNvPr id="6" name="Ovaal 2">
+            <a:extLst>
+              <a:ext uri="{FF2B5EF4-FFF2-40B4-BE49-F238E27FC236}">
+                <a16:creationId xmlns:a16="http://schemas.microsoft.com/office/drawing/2014/main" id="{0B92EB4B-FDE0-4F62-A758-B67121D2C740}"/>
+              </a:ext>
+            </a:extLst>
+          </p:cNvPr>
+          <p:cNvSpPr/>
+          <p:nvPr/>
+        </p:nvSpPr>
+        <p:spPr>
+          <a:xfrm>
+            <a:off x="5370053" y="315010"/>
+            <a:ext cx="1409700" cy="393700"/>
+          </a:xfrm>
+          <a:prstGeom prst="ellipse">
+            <a:avLst/>
+          </a:prstGeom>
+          <a:noFill/>
+        </p:spPr>
+        <p:style>
+          <a:lnRef idx="2">
+            <a:schemeClr val="accent1">
+              <a:shade val="50000"/>
+            </a:schemeClr>
+          </a:lnRef>
+          <a:fillRef idx="1">
+            <a:schemeClr val="accent1"/>
+          </a:fillRef>
+          <a:effectRef idx="0">
+            <a:schemeClr val="accent1"/>
+          </a:effectRef>
+          <a:fontRef idx="minor">
+            <a:schemeClr val="lt1"/>
+          </a:fontRef>
+        </p:style>
+        <p:txBody>
+          <a:bodyPr rtlCol="0" anchor="ctr"/>
+          <a:lstStyle/>
+          <a:p>
+            <a:pPr algn="ctr"/>
+            <a:endParaRPr lang="nl-BE" dirty="0"/>
+          </a:p>
+        </p:txBody>
+      </p:sp>
+      <p:sp>
+        <p:nvSpPr>
+          <p:cNvPr id="7" name="Tekstvak 4">
+            <a:extLst>
+              <a:ext uri="{FF2B5EF4-FFF2-40B4-BE49-F238E27FC236}">
+                <a16:creationId xmlns:a16="http://schemas.microsoft.com/office/drawing/2014/main" id="{A2F9561E-00C3-4249-BC2B-01BE5FEE88DE}"/>
+              </a:ext>
+            </a:extLst>
+          </p:cNvPr>
+          <p:cNvSpPr txBox="1"/>
+          <p:nvPr/>
+        </p:nvSpPr>
+        <p:spPr>
+          <a:xfrm>
+            <a:off x="5789153" y="302310"/>
+            <a:ext cx="613694" cy="369332"/>
+          </a:xfrm>
+          <a:prstGeom prst="rect">
+            <a:avLst/>
+          </a:prstGeom>
+          <a:noFill/>
+        </p:spPr>
+        <p:txBody>
+          <a:bodyPr wrap="none" rtlCol="0">
+            <a:spAutoFit/>
+          </a:bodyPr>
+          <a:lstStyle/>
+          <a:p>
+            <a:r>
+              <a:rPr lang="nl-BE" dirty="0"/>
+              <a:t>start</a:t>
+            </a:r>
+          </a:p>
+        </p:txBody>
+      </p:sp>
+      <p:sp>
+        <p:nvSpPr>
+          <p:cNvPr id="8" name="Tekstvak 7">
+            <a:extLst>
+              <a:ext uri="{FF2B5EF4-FFF2-40B4-BE49-F238E27FC236}">
+                <a16:creationId xmlns:a16="http://schemas.microsoft.com/office/drawing/2014/main" id="{691C5CC9-BA87-44A6-8A91-37B03F9C3443}"/>
+              </a:ext>
+            </a:extLst>
+          </p:cNvPr>
+          <p:cNvSpPr txBox="1"/>
+          <p:nvPr/>
+        </p:nvSpPr>
+        <p:spPr>
+          <a:xfrm>
+            <a:off x="4884329" y="1192768"/>
+            <a:ext cx="2426113" cy="369332"/>
+          </a:xfrm>
+          <a:prstGeom prst="rect">
+            <a:avLst/>
+          </a:prstGeom>
+          <a:noFill/>
+        </p:spPr>
+        <p:txBody>
+          <a:bodyPr wrap="none" rtlCol="0">
+            <a:spAutoFit/>
+          </a:bodyPr>
+          <a:lstStyle/>
+          <a:p>
+            <a:r>
+              <a:rPr lang="nl-BE" dirty="0"/>
+              <a:t>Get random </a:t>
+            </a:r>
+            <a:r>
+              <a:rPr lang="nl-BE" dirty="0" err="1"/>
+              <a:t>reservation</a:t>
+            </a:r>
+            <a:endParaRPr lang="nl-BE" dirty="0"/>
+          </a:p>
+        </p:txBody>
+      </p:sp>
+      <p:sp>
+        <p:nvSpPr>
+          <p:cNvPr id="9" name="Tekstvak 10">
+            <a:extLst>
+              <a:ext uri="{FF2B5EF4-FFF2-40B4-BE49-F238E27FC236}">
+                <a16:creationId xmlns:a16="http://schemas.microsoft.com/office/drawing/2014/main" id="{7852C69F-C1B4-4779-B229-737DB9AD4C1E}"/>
+              </a:ext>
+            </a:extLst>
+          </p:cNvPr>
+          <p:cNvSpPr txBox="1"/>
+          <p:nvPr/>
+        </p:nvSpPr>
+        <p:spPr>
+          <a:xfrm>
+            <a:off x="5463464" y="2185005"/>
+            <a:ext cx="1232773" cy="369332"/>
+          </a:xfrm>
+          <a:prstGeom prst="rect">
+            <a:avLst/>
+          </a:prstGeom>
+          <a:noFill/>
+        </p:spPr>
+        <p:txBody>
+          <a:bodyPr wrap="none" rtlCol="0">
+            <a:spAutoFit/>
+          </a:bodyPr>
+          <a:lstStyle/>
+          <a:p>
+            <a:r>
+              <a:rPr lang="nl-BE" dirty="0"/>
+              <a:t>Get vehicle</a:t>
+            </a:r>
+          </a:p>
+        </p:txBody>
+      </p:sp>
+      <p:sp>
+        <p:nvSpPr>
+          <p:cNvPr id="10" name="Tekstvak 30">
+            <a:extLst>
+              <a:ext uri="{FF2B5EF4-FFF2-40B4-BE49-F238E27FC236}">
+                <a16:creationId xmlns:a16="http://schemas.microsoft.com/office/drawing/2014/main" id="{85723D04-0961-46AB-8249-8E9640712FA6}"/>
+              </a:ext>
+            </a:extLst>
+          </p:cNvPr>
+          <p:cNvSpPr txBox="1"/>
+          <p:nvPr/>
+        </p:nvSpPr>
+        <p:spPr>
+          <a:xfrm>
+            <a:off x="5107344" y="3231992"/>
+            <a:ext cx="1969770" cy="369332"/>
+          </a:xfrm>
+          <a:prstGeom prst="rect">
+            <a:avLst/>
+          </a:prstGeom>
+          <a:noFill/>
+        </p:spPr>
+        <p:txBody>
+          <a:bodyPr wrap="none" rtlCol="0">
+            <a:spAutoFit/>
+          </a:bodyPr>
+          <a:lstStyle/>
+          <a:p>
+            <a:r>
+              <a:rPr lang="nl-BE" dirty="0"/>
+              <a:t>Is vehicle </a:t>
+            </a:r>
+            <a:r>
+              <a:rPr lang="nl-BE" dirty="0" err="1"/>
+              <a:t>possible</a:t>
+            </a:r>
+            <a:r>
+              <a:rPr lang="nl-BE" dirty="0"/>
+              <a:t>?</a:t>
+            </a:r>
+          </a:p>
+        </p:txBody>
+      </p:sp>
+      <p:sp>
+        <p:nvSpPr>
+          <p:cNvPr id="11" name="Rechthoek 45">
+            <a:extLst>
+              <a:ext uri="{FF2B5EF4-FFF2-40B4-BE49-F238E27FC236}">
+                <a16:creationId xmlns:a16="http://schemas.microsoft.com/office/drawing/2014/main" id="{755D6C69-7490-4F62-B577-521540B85AA1}"/>
+              </a:ext>
+            </a:extLst>
+          </p:cNvPr>
+          <p:cNvSpPr/>
+          <p:nvPr/>
+        </p:nvSpPr>
+        <p:spPr>
+          <a:xfrm>
+            <a:off x="4866793" y="2025739"/>
+            <a:ext cx="2426113" cy="635000"/>
+          </a:xfrm>
+          <a:prstGeom prst="rect">
+            <a:avLst/>
+          </a:prstGeom>
+          <a:noFill/>
+        </p:spPr>
+        <p:style>
+          <a:lnRef idx="2">
+            <a:schemeClr val="accent1">
+              <a:shade val="50000"/>
+            </a:schemeClr>
+          </a:lnRef>
+          <a:fillRef idx="1">
+            <a:schemeClr val="accent1"/>
+          </a:fillRef>
+          <a:effectRef idx="0">
+            <a:schemeClr val="accent1"/>
+          </a:effectRef>
+          <a:fontRef idx="minor">
+            <a:schemeClr val="lt1"/>
+          </a:fontRef>
+        </p:style>
+        <p:txBody>
+          <a:bodyPr rtlCol="0" anchor="ctr"/>
+          <a:lstStyle/>
+          <a:p>
+            <a:pPr algn="ctr"/>
+            <a:endParaRPr lang="nl-BE"/>
+          </a:p>
+        </p:txBody>
+      </p:sp>
+      <p:sp>
+        <p:nvSpPr>
+          <p:cNvPr id="12" name="Rechthoek 46">
+            <a:extLst>
+              <a:ext uri="{FF2B5EF4-FFF2-40B4-BE49-F238E27FC236}">
+                <a16:creationId xmlns:a16="http://schemas.microsoft.com/office/drawing/2014/main" id="{25F9CFCF-BBBF-4790-A662-81AAA86DE95D}"/>
+              </a:ext>
+            </a:extLst>
+          </p:cNvPr>
+          <p:cNvSpPr/>
+          <p:nvPr/>
+        </p:nvSpPr>
+        <p:spPr>
+          <a:xfrm>
+            <a:off x="4866793" y="1050151"/>
+            <a:ext cx="2426113" cy="635000"/>
+          </a:xfrm>
+          <a:prstGeom prst="rect">
+            <a:avLst/>
+          </a:prstGeom>
+          <a:noFill/>
+        </p:spPr>
+        <p:style>
+          <a:lnRef idx="2">
+            <a:schemeClr val="accent1">
+              <a:shade val="50000"/>
+            </a:schemeClr>
+          </a:lnRef>
+          <a:fillRef idx="1">
+            <a:schemeClr val="accent1"/>
+          </a:fillRef>
+          <a:effectRef idx="0">
+            <a:schemeClr val="accent1"/>
+          </a:effectRef>
+          <a:fontRef idx="minor">
+            <a:schemeClr val="lt1"/>
+          </a:fontRef>
+        </p:style>
+        <p:txBody>
+          <a:bodyPr rtlCol="0" anchor="ctr"/>
+          <a:lstStyle/>
+          <a:p>
+            <a:pPr algn="ctr"/>
+            <a:endParaRPr lang="nl-BE"/>
+          </a:p>
+        </p:txBody>
+      </p:sp>
+      <p:sp>
+        <p:nvSpPr>
+          <p:cNvPr id="13" name="Ruit 44">
+            <a:extLst>
+              <a:ext uri="{FF2B5EF4-FFF2-40B4-BE49-F238E27FC236}">
+                <a16:creationId xmlns:a16="http://schemas.microsoft.com/office/drawing/2014/main" id="{430DD689-7903-485C-B32E-3C31733E220B}"/>
+              </a:ext>
+            </a:extLst>
+          </p:cNvPr>
+          <p:cNvSpPr/>
+          <p:nvPr/>
+        </p:nvSpPr>
+        <p:spPr>
+          <a:xfrm>
+            <a:off x="4921783" y="3001327"/>
+            <a:ext cx="2319677" cy="838200"/>
+          </a:xfrm>
+          <a:prstGeom prst="diamond">
+            <a:avLst/>
+          </a:prstGeom>
+          <a:noFill/>
+        </p:spPr>
+        <p:style>
+          <a:lnRef idx="2">
+            <a:schemeClr val="accent1">
+              <a:shade val="50000"/>
+            </a:schemeClr>
+          </a:lnRef>
+          <a:fillRef idx="1">
+            <a:schemeClr val="accent1"/>
+          </a:fillRef>
+          <a:effectRef idx="0">
+            <a:schemeClr val="accent1"/>
+          </a:effectRef>
+          <a:fontRef idx="minor">
+            <a:schemeClr val="lt1"/>
+          </a:fontRef>
+        </p:style>
+        <p:txBody>
+          <a:bodyPr rtlCol="0" anchor="ctr"/>
+          <a:lstStyle/>
+          <a:p>
+            <a:pPr algn="ctr"/>
+            <a:endParaRPr lang="nl-BE"/>
+          </a:p>
+        </p:txBody>
+      </p:sp>
+      <p:sp>
+        <p:nvSpPr>
+          <p:cNvPr id="14" name="Tekstvak 48">
+            <a:extLst>
+              <a:ext uri="{FF2B5EF4-FFF2-40B4-BE49-F238E27FC236}">
+                <a16:creationId xmlns:a16="http://schemas.microsoft.com/office/drawing/2014/main" id="{256B01DB-9FC7-4E12-819D-4CE81B9C8806}"/>
+              </a:ext>
+            </a:extLst>
+          </p:cNvPr>
+          <p:cNvSpPr txBox="1"/>
+          <p:nvPr/>
+        </p:nvSpPr>
+        <p:spPr>
+          <a:xfrm>
+            <a:off x="2567864" y="3236793"/>
+            <a:ext cx="1544975" cy="369332"/>
+          </a:xfrm>
+          <a:prstGeom prst="rect">
+            <a:avLst/>
+          </a:prstGeom>
+          <a:noFill/>
+        </p:spPr>
+        <p:txBody>
+          <a:bodyPr wrap="none" rtlCol="0">
+            <a:spAutoFit/>
+          </a:bodyPr>
+          <a:lstStyle/>
+          <a:p>
+            <a:r>
+              <a:rPr lang="nl-BE" dirty="0" err="1"/>
+              <a:t>Assign</a:t>
+            </a:r>
+            <a:r>
+              <a:rPr lang="nl-BE" dirty="0"/>
+              <a:t> vehicle</a:t>
+            </a:r>
+          </a:p>
+        </p:txBody>
+      </p:sp>
+      <p:sp>
+        <p:nvSpPr>
+          <p:cNvPr id="15" name="Rechthoek 49">
+            <a:extLst>
+              <a:ext uri="{FF2B5EF4-FFF2-40B4-BE49-F238E27FC236}">
+                <a16:creationId xmlns:a16="http://schemas.microsoft.com/office/drawing/2014/main" id="{7FD0FB26-294D-4969-86ED-13060C2616DC}"/>
+              </a:ext>
+            </a:extLst>
+          </p:cNvPr>
+          <p:cNvSpPr/>
+          <p:nvPr/>
+        </p:nvSpPr>
+        <p:spPr>
+          <a:xfrm>
+            <a:off x="2136293" y="3102927"/>
+            <a:ext cx="2426113" cy="635000"/>
+          </a:xfrm>
+          <a:prstGeom prst="rect">
+            <a:avLst/>
+          </a:prstGeom>
+          <a:noFill/>
+        </p:spPr>
+        <p:style>
+          <a:lnRef idx="2">
+            <a:schemeClr val="accent1">
+              <a:shade val="50000"/>
+            </a:schemeClr>
+          </a:lnRef>
+          <a:fillRef idx="1">
+            <a:schemeClr val="accent1"/>
+          </a:fillRef>
+          <a:effectRef idx="0">
+            <a:schemeClr val="accent1"/>
+          </a:effectRef>
+          <a:fontRef idx="minor">
+            <a:schemeClr val="lt1"/>
+          </a:fontRef>
+        </p:style>
+        <p:txBody>
+          <a:bodyPr rtlCol="0" anchor="ctr"/>
+          <a:lstStyle/>
+          <a:p>
+            <a:pPr algn="ctr"/>
+            <a:endParaRPr lang="nl-BE"/>
+          </a:p>
+        </p:txBody>
+      </p:sp>
+      <p:cxnSp>
+        <p:nvCxnSpPr>
+          <p:cNvPr id="16" name="Rechte verbindingslijn met pijl 52">
+            <a:extLst>
+              <a:ext uri="{FF2B5EF4-FFF2-40B4-BE49-F238E27FC236}">
+                <a16:creationId xmlns:a16="http://schemas.microsoft.com/office/drawing/2014/main" id="{2E3DC276-06EC-4659-8ED7-DD2B41E48A25}"/>
+              </a:ext>
+            </a:extLst>
+          </p:cNvPr>
+          <p:cNvCxnSpPr>
+            <a:stCxn id="6" idx="4"/>
+            <a:endCxn id="12" idx="0"/>
+          </p:cNvCxnSpPr>
+          <p:nvPr/>
+        </p:nvCxnSpPr>
+        <p:spPr>
+          <a:xfrm>
+            <a:off x="6074903" y="708710"/>
+            <a:ext cx="4947" cy="341441"/>
+          </a:xfrm>
+          <a:prstGeom prst="straightConnector1">
+            <a:avLst/>
+          </a:prstGeom>
+          <a:ln>
+            <a:tailEnd type="triangle"/>
+          </a:ln>
+        </p:spPr>
+        <p:style>
+          <a:lnRef idx="1">
+            <a:schemeClr val="accent1"/>
+          </a:lnRef>
+          <a:fillRef idx="0">
+            <a:schemeClr val="accent1"/>
+          </a:fillRef>
+          <a:effectRef idx="0">
+            <a:schemeClr val="accent1"/>
+          </a:effectRef>
+          <a:fontRef idx="minor">
+            <a:schemeClr val="tx1"/>
+          </a:fontRef>
+        </p:style>
+      </p:cxnSp>
+      <p:cxnSp>
+        <p:nvCxnSpPr>
+          <p:cNvPr id="17" name="Rechte verbindingslijn met pijl 54">
+            <a:extLst>
+              <a:ext uri="{FF2B5EF4-FFF2-40B4-BE49-F238E27FC236}">
+                <a16:creationId xmlns:a16="http://schemas.microsoft.com/office/drawing/2014/main" id="{E3BCD7F4-D7D9-4C85-B4A3-2B5B4384DBB9}"/>
+              </a:ext>
+            </a:extLst>
+          </p:cNvPr>
+          <p:cNvCxnSpPr>
+            <a:stCxn id="12" idx="2"/>
+            <a:endCxn id="11" idx="0"/>
+          </p:cNvCxnSpPr>
+          <p:nvPr/>
+        </p:nvCxnSpPr>
+        <p:spPr>
+          <a:xfrm>
+            <a:off x="6079850" y="1685151"/>
+            <a:ext cx="0" cy="340588"/>
+          </a:xfrm>
+          <a:prstGeom prst="straightConnector1">
+            <a:avLst/>
+          </a:prstGeom>
+          <a:ln>
+            <a:tailEnd type="triangle"/>
+          </a:ln>
+        </p:spPr>
+        <p:style>
+          <a:lnRef idx="1">
+            <a:schemeClr val="accent1"/>
+          </a:lnRef>
+          <a:fillRef idx="0">
+            <a:schemeClr val="accent1"/>
+          </a:fillRef>
+          <a:effectRef idx="0">
+            <a:schemeClr val="accent1"/>
+          </a:effectRef>
+          <a:fontRef idx="minor">
+            <a:schemeClr val="tx1"/>
+          </a:fontRef>
+        </p:style>
+      </p:cxnSp>
+      <p:cxnSp>
+        <p:nvCxnSpPr>
+          <p:cNvPr id="18" name="Rechte verbindingslijn met pijl 56">
+            <a:extLst>
+              <a:ext uri="{FF2B5EF4-FFF2-40B4-BE49-F238E27FC236}">
+                <a16:creationId xmlns:a16="http://schemas.microsoft.com/office/drawing/2014/main" id="{0FDA69A2-5DCF-4429-8B40-C7403170556C}"/>
+              </a:ext>
+            </a:extLst>
+          </p:cNvPr>
+          <p:cNvCxnSpPr>
+            <a:stCxn id="11" idx="2"/>
+            <a:endCxn id="13" idx="0"/>
+          </p:cNvCxnSpPr>
+          <p:nvPr/>
+        </p:nvCxnSpPr>
+        <p:spPr>
+          <a:xfrm>
+            <a:off x="6079850" y="2660739"/>
+            <a:ext cx="1772" cy="340588"/>
+          </a:xfrm>
+          <a:prstGeom prst="straightConnector1">
+            <a:avLst/>
+          </a:prstGeom>
+          <a:ln>
+            <a:tailEnd type="triangle"/>
+          </a:ln>
+        </p:spPr>
+        <p:style>
+          <a:lnRef idx="1">
+            <a:schemeClr val="accent1"/>
+          </a:lnRef>
+          <a:fillRef idx="0">
+            <a:schemeClr val="accent1"/>
+          </a:fillRef>
+          <a:effectRef idx="0">
+            <a:schemeClr val="accent1"/>
+          </a:effectRef>
+          <a:fontRef idx="minor">
+            <a:schemeClr val="tx1"/>
+          </a:fontRef>
+        </p:style>
+      </p:cxnSp>
+      <p:cxnSp>
+        <p:nvCxnSpPr>
+          <p:cNvPr id="19" name="Rechte verbindingslijn met pijl 58">
+            <a:extLst>
+              <a:ext uri="{FF2B5EF4-FFF2-40B4-BE49-F238E27FC236}">
+                <a16:creationId xmlns:a16="http://schemas.microsoft.com/office/drawing/2014/main" id="{BEC67CD4-B57A-4CDD-8C11-BBBE59A106F7}"/>
+              </a:ext>
+            </a:extLst>
+          </p:cNvPr>
+          <p:cNvCxnSpPr>
+            <a:stCxn id="13" idx="1"/>
+            <a:endCxn id="15" idx="3"/>
+          </p:cNvCxnSpPr>
+          <p:nvPr/>
+        </p:nvCxnSpPr>
+        <p:spPr>
+          <a:xfrm flipH="1">
+            <a:off x="4562406" y="3420427"/>
+            <a:ext cx="359377" cy="0"/>
+          </a:xfrm>
+          <a:prstGeom prst="straightConnector1">
+            <a:avLst/>
+          </a:prstGeom>
+          <a:ln>
+            <a:tailEnd type="triangle"/>
+          </a:ln>
+        </p:spPr>
+        <p:style>
+          <a:lnRef idx="1">
+            <a:schemeClr val="accent1"/>
+          </a:lnRef>
+          <a:fillRef idx="0">
+            <a:schemeClr val="accent1"/>
+          </a:fillRef>
+          <a:effectRef idx="0">
+            <a:schemeClr val="accent1"/>
+          </a:effectRef>
+          <a:fontRef idx="minor">
+            <a:schemeClr val="tx1"/>
+          </a:fontRef>
+        </p:style>
+      </p:cxnSp>
+      <p:sp>
+        <p:nvSpPr>
+          <p:cNvPr id="20" name="Tekstvak 59">
+            <a:extLst>
+              <a:ext uri="{FF2B5EF4-FFF2-40B4-BE49-F238E27FC236}">
+                <a16:creationId xmlns:a16="http://schemas.microsoft.com/office/drawing/2014/main" id="{BFD921C6-8880-47B9-801C-AC50828EBCC2}"/>
+              </a:ext>
+            </a:extLst>
+          </p:cNvPr>
+          <p:cNvSpPr txBox="1"/>
+          <p:nvPr/>
+        </p:nvSpPr>
+        <p:spPr>
+          <a:xfrm>
+            <a:off x="4686496" y="3096736"/>
+            <a:ext cx="296876" cy="369332"/>
+          </a:xfrm>
+          <a:prstGeom prst="rect">
+            <a:avLst/>
+          </a:prstGeom>
+          <a:noFill/>
+        </p:spPr>
+        <p:txBody>
+          <a:bodyPr wrap="none" rtlCol="0">
+            <a:spAutoFit/>
+          </a:bodyPr>
+          <a:lstStyle/>
+          <a:p>
+            <a:r>
+              <a:rPr lang="nl-BE" dirty="0"/>
+              <a:t>Y</a:t>
+            </a:r>
+          </a:p>
+        </p:txBody>
+      </p:sp>
+      <p:sp>
+        <p:nvSpPr>
+          <p:cNvPr id="21" name="Tekstvak 61">
+            <a:extLst>
+              <a:ext uri="{FF2B5EF4-FFF2-40B4-BE49-F238E27FC236}">
+                <a16:creationId xmlns:a16="http://schemas.microsoft.com/office/drawing/2014/main" id="{F1EE0BB3-9249-46F8-B4C6-09CA23E91E6C}"/>
+              </a:ext>
+            </a:extLst>
+          </p:cNvPr>
+          <p:cNvSpPr txBox="1"/>
+          <p:nvPr/>
+        </p:nvSpPr>
+        <p:spPr>
+          <a:xfrm>
+            <a:off x="4834780" y="5376325"/>
+            <a:ext cx="2668679" cy="646331"/>
+          </a:xfrm>
+          <a:prstGeom prst="rect">
+            <a:avLst/>
+          </a:prstGeom>
+          <a:noFill/>
+        </p:spPr>
+        <p:txBody>
+          <a:bodyPr wrap="none" rtlCol="0">
+            <a:spAutoFit/>
+          </a:bodyPr>
+          <a:lstStyle/>
+          <a:p>
+            <a:r>
+              <a:rPr lang="nl-BE" dirty="0" err="1"/>
+              <a:t>Find</a:t>
+            </a:r>
+            <a:r>
+              <a:rPr lang="nl-BE" dirty="0"/>
+              <a:t> </a:t>
+            </a:r>
+            <a:r>
+              <a:rPr lang="nl-BE" dirty="0" err="1"/>
+              <a:t>unassigned</a:t>
+            </a:r>
+            <a:r>
+              <a:rPr lang="nl-BE" dirty="0"/>
+              <a:t> vehicle &amp; </a:t>
+            </a:r>
+          </a:p>
+          <a:p>
+            <a:r>
+              <a:rPr lang="nl-BE" dirty="0" err="1"/>
+              <a:t>assign</a:t>
+            </a:r>
+            <a:r>
+              <a:rPr lang="nl-BE" dirty="0"/>
+              <a:t> </a:t>
+            </a:r>
+            <a:r>
+              <a:rPr lang="nl-BE" dirty="0" err="1"/>
+              <a:t>to</a:t>
+            </a:r>
+            <a:r>
+              <a:rPr lang="nl-BE" dirty="0"/>
+              <a:t> </a:t>
+            </a:r>
+            <a:r>
+              <a:rPr lang="nl-BE" dirty="0" err="1"/>
+              <a:t>reservation</a:t>
+            </a:r>
+            <a:endParaRPr lang="nl-BE" dirty="0"/>
+          </a:p>
+        </p:txBody>
+      </p:sp>
+      <p:sp>
+        <p:nvSpPr>
+          <p:cNvPr id="22" name="Rechthoek 62">
+            <a:extLst>
+              <a:ext uri="{FF2B5EF4-FFF2-40B4-BE49-F238E27FC236}">
+                <a16:creationId xmlns:a16="http://schemas.microsoft.com/office/drawing/2014/main" id="{EE4726CF-8C73-4B37-B3CC-4A9264A11A48}"/>
+              </a:ext>
+            </a:extLst>
+          </p:cNvPr>
+          <p:cNvSpPr/>
+          <p:nvPr/>
+        </p:nvSpPr>
+        <p:spPr>
+          <a:xfrm>
+            <a:off x="4877954" y="5359428"/>
+            <a:ext cx="2426113" cy="635000"/>
+          </a:xfrm>
+          <a:prstGeom prst="rect">
+            <a:avLst/>
+          </a:prstGeom>
+          <a:noFill/>
+        </p:spPr>
+        <p:style>
+          <a:lnRef idx="2">
+            <a:schemeClr val="accent1">
+              <a:shade val="50000"/>
+            </a:schemeClr>
+          </a:lnRef>
+          <a:fillRef idx="1">
+            <a:schemeClr val="accent1"/>
+          </a:fillRef>
+          <a:effectRef idx="0">
+            <a:schemeClr val="accent1"/>
+          </a:effectRef>
+          <a:fontRef idx="minor">
+            <a:schemeClr val="lt1"/>
+          </a:fontRef>
+        </p:style>
+        <p:txBody>
+          <a:bodyPr rtlCol="0" anchor="ctr"/>
+          <a:lstStyle/>
+          <a:p>
+            <a:pPr algn="ctr"/>
+            <a:endParaRPr lang="nl-BE"/>
+          </a:p>
+        </p:txBody>
+      </p:sp>
+      <p:sp>
+        <p:nvSpPr>
+          <p:cNvPr id="23" name="Tekstvak 63">
+            <a:extLst>
+              <a:ext uri="{FF2B5EF4-FFF2-40B4-BE49-F238E27FC236}">
+                <a16:creationId xmlns:a16="http://schemas.microsoft.com/office/drawing/2014/main" id="{C18A9D02-7090-4843-96B6-A60D955384C0}"/>
+              </a:ext>
+            </a:extLst>
+          </p:cNvPr>
+          <p:cNvSpPr txBox="1"/>
+          <p:nvPr/>
+        </p:nvSpPr>
+        <p:spPr>
+          <a:xfrm>
+            <a:off x="5115854" y="4410780"/>
+            <a:ext cx="1927131" cy="369332"/>
+          </a:xfrm>
+          <a:prstGeom prst="rect">
+            <a:avLst/>
+          </a:prstGeom>
+          <a:noFill/>
+        </p:spPr>
+        <p:txBody>
+          <a:bodyPr wrap="none" rtlCol="0">
+            <a:spAutoFit/>
+          </a:bodyPr>
+          <a:lstStyle/>
+          <a:p>
+            <a:r>
+              <a:rPr lang="nl-BE" dirty="0"/>
+              <a:t>End of vehicle list?</a:t>
+            </a:r>
+          </a:p>
+        </p:txBody>
+      </p:sp>
+      <p:sp>
+        <p:nvSpPr>
+          <p:cNvPr id="24" name="Ruit 64">
+            <a:extLst>
+              <a:ext uri="{FF2B5EF4-FFF2-40B4-BE49-F238E27FC236}">
+                <a16:creationId xmlns:a16="http://schemas.microsoft.com/office/drawing/2014/main" id="{A9216F5A-6375-44F3-BA0C-BCB5B186D424}"/>
+              </a:ext>
+            </a:extLst>
+          </p:cNvPr>
+          <p:cNvSpPr/>
+          <p:nvPr/>
+        </p:nvSpPr>
+        <p:spPr>
+          <a:xfrm>
+            <a:off x="4930293" y="4180115"/>
+            <a:ext cx="2319677" cy="838200"/>
+          </a:xfrm>
+          <a:prstGeom prst="diamond">
+            <a:avLst/>
+          </a:prstGeom>
+          <a:noFill/>
+        </p:spPr>
+        <p:style>
+          <a:lnRef idx="2">
+            <a:schemeClr val="accent1">
+              <a:shade val="50000"/>
+            </a:schemeClr>
+          </a:lnRef>
+          <a:fillRef idx="1">
+            <a:schemeClr val="accent1"/>
+          </a:fillRef>
+          <a:effectRef idx="0">
+            <a:schemeClr val="accent1"/>
+          </a:effectRef>
+          <a:fontRef idx="minor">
+            <a:schemeClr val="lt1"/>
+          </a:fontRef>
+        </p:style>
+        <p:txBody>
+          <a:bodyPr rtlCol="0" anchor="ctr"/>
+          <a:lstStyle/>
+          <a:p>
+            <a:pPr algn="ctr"/>
+            <a:endParaRPr lang="nl-BE"/>
+          </a:p>
+        </p:txBody>
+      </p:sp>
+      <p:cxnSp>
+        <p:nvCxnSpPr>
+          <p:cNvPr id="25" name="Rechte verbindingslijn met pijl 65">
+            <a:extLst>
+              <a:ext uri="{FF2B5EF4-FFF2-40B4-BE49-F238E27FC236}">
+                <a16:creationId xmlns:a16="http://schemas.microsoft.com/office/drawing/2014/main" id="{898BBD77-2E53-4749-A651-EBE53A6962A3}"/>
+              </a:ext>
+            </a:extLst>
+          </p:cNvPr>
+          <p:cNvCxnSpPr>
+            <a:stCxn id="13" idx="2"/>
+            <a:endCxn id="24" idx="0"/>
+          </p:cNvCxnSpPr>
+          <p:nvPr/>
+        </p:nvCxnSpPr>
+        <p:spPr>
+          <a:xfrm>
+            <a:off x="6081622" y="3839527"/>
+            <a:ext cx="8510" cy="340588"/>
+          </a:xfrm>
+          <a:prstGeom prst="straightConnector1">
+            <a:avLst/>
+          </a:prstGeom>
+          <a:ln>
+            <a:tailEnd type="triangle"/>
+          </a:ln>
+        </p:spPr>
+        <p:style>
+          <a:lnRef idx="1">
+            <a:schemeClr val="accent1"/>
+          </a:lnRef>
+          <a:fillRef idx="0">
+            <a:schemeClr val="accent1"/>
+          </a:fillRef>
+          <a:effectRef idx="0">
+            <a:schemeClr val="accent1"/>
+          </a:effectRef>
+          <a:fontRef idx="minor">
+            <a:schemeClr val="tx1"/>
+          </a:fontRef>
+        </p:style>
+      </p:cxnSp>
+      <p:cxnSp>
+        <p:nvCxnSpPr>
+          <p:cNvPr id="26" name="Verbindingslijn: gebogen 69">
+            <a:extLst>
+              <a:ext uri="{FF2B5EF4-FFF2-40B4-BE49-F238E27FC236}">
+                <a16:creationId xmlns:a16="http://schemas.microsoft.com/office/drawing/2014/main" id="{1147ABBA-89E7-47AC-8E10-399A5C4263A1}"/>
+              </a:ext>
+            </a:extLst>
+          </p:cNvPr>
+          <p:cNvCxnSpPr>
+            <a:cxnSpLocks/>
+            <a:stCxn id="24" idx="3"/>
+            <a:endCxn id="11" idx="3"/>
+          </p:cNvCxnSpPr>
+          <p:nvPr/>
+        </p:nvCxnSpPr>
+        <p:spPr>
+          <a:xfrm flipV="1">
+            <a:off x="7249970" y="2343239"/>
+            <a:ext cx="42936" cy="2255976"/>
+          </a:xfrm>
+          <a:prstGeom prst="bentConnector3">
+            <a:avLst>
+              <a:gd name="adj1" fmla="val 987367"/>
+            </a:avLst>
+          </a:prstGeom>
+          <a:ln>
+            <a:tailEnd type="triangle"/>
+          </a:ln>
+        </p:spPr>
+        <p:style>
+          <a:lnRef idx="1">
+            <a:schemeClr val="accent1"/>
+          </a:lnRef>
+          <a:fillRef idx="0">
+            <a:schemeClr val="accent1"/>
+          </a:fillRef>
+          <a:effectRef idx="0">
+            <a:schemeClr val="accent1"/>
+          </a:effectRef>
+          <a:fontRef idx="minor">
+            <a:schemeClr val="tx1"/>
+          </a:fontRef>
+        </p:style>
+      </p:cxnSp>
+      <p:sp>
+        <p:nvSpPr>
+          <p:cNvPr id="27" name="Tekstvak 73">
+            <a:extLst>
+              <a:ext uri="{FF2B5EF4-FFF2-40B4-BE49-F238E27FC236}">
+                <a16:creationId xmlns:a16="http://schemas.microsoft.com/office/drawing/2014/main" id="{ED359D5D-8F15-43AB-8D5E-FFAC1021064E}"/>
+              </a:ext>
+            </a:extLst>
+          </p:cNvPr>
+          <p:cNvSpPr txBox="1"/>
+          <p:nvPr/>
+        </p:nvSpPr>
+        <p:spPr>
+          <a:xfrm>
+            <a:off x="6115763" y="3798669"/>
+            <a:ext cx="333746" cy="369332"/>
+          </a:xfrm>
+          <a:prstGeom prst="rect">
+            <a:avLst/>
+          </a:prstGeom>
+          <a:noFill/>
+        </p:spPr>
+        <p:txBody>
+          <a:bodyPr wrap="none" rtlCol="0">
+            <a:spAutoFit/>
+          </a:bodyPr>
+          <a:lstStyle/>
+          <a:p>
+            <a:r>
+              <a:rPr lang="nl-BE" dirty="0"/>
+              <a:t>N</a:t>
+            </a:r>
+          </a:p>
+        </p:txBody>
+      </p:sp>
+      <p:sp>
+        <p:nvSpPr>
+          <p:cNvPr id="28" name="Tekstvak 76">
+            <a:extLst>
+              <a:ext uri="{FF2B5EF4-FFF2-40B4-BE49-F238E27FC236}">
+                <a16:creationId xmlns:a16="http://schemas.microsoft.com/office/drawing/2014/main" id="{4A03D247-5E3D-40F8-BCED-8820487B3969}"/>
+              </a:ext>
+            </a:extLst>
+          </p:cNvPr>
+          <p:cNvSpPr txBox="1"/>
+          <p:nvPr/>
+        </p:nvSpPr>
+        <p:spPr>
+          <a:xfrm>
+            <a:off x="7169713" y="4241997"/>
+            <a:ext cx="333746" cy="369332"/>
+          </a:xfrm>
+          <a:prstGeom prst="rect">
+            <a:avLst/>
+          </a:prstGeom>
+          <a:noFill/>
+        </p:spPr>
+        <p:txBody>
+          <a:bodyPr wrap="none" rtlCol="0">
+            <a:spAutoFit/>
+          </a:bodyPr>
+          <a:lstStyle/>
+          <a:p>
+            <a:r>
+              <a:rPr lang="nl-BE" dirty="0"/>
+              <a:t>N</a:t>
+            </a:r>
+          </a:p>
+        </p:txBody>
+      </p:sp>
+      <p:cxnSp>
+        <p:nvCxnSpPr>
+          <p:cNvPr id="29" name="Rechte verbindingslijn met pijl 77">
+            <a:extLst>
+              <a:ext uri="{FF2B5EF4-FFF2-40B4-BE49-F238E27FC236}">
+                <a16:creationId xmlns:a16="http://schemas.microsoft.com/office/drawing/2014/main" id="{21FC3F4A-C7AB-4402-8C04-68117CD6CC6C}"/>
+              </a:ext>
+            </a:extLst>
+          </p:cNvPr>
+          <p:cNvCxnSpPr>
+            <a:stCxn id="24" idx="2"/>
+            <a:endCxn id="22" idx="0"/>
+          </p:cNvCxnSpPr>
+          <p:nvPr/>
+        </p:nvCxnSpPr>
+        <p:spPr>
+          <a:xfrm>
+            <a:off x="6090132" y="5018315"/>
+            <a:ext cx="879" cy="341113"/>
+          </a:xfrm>
+          <a:prstGeom prst="straightConnector1">
+            <a:avLst/>
+          </a:prstGeom>
+          <a:ln>
+            <a:tailEnd type="triangle"/>
+          </a:ln>
+        </p:spPr>
+        <p:style>
+          <a:lnRef idx="1">
+            <a:schemeClr val="accent1"/>
+          </a:lnRef>
+          <a:fillRef idx="0">
+            <a:schemeClr val="accent1"/>
+          </a:fillRef>
+          <a:effectRef idx="0">
+            <a:schemeClr val="accent1"/>
+          </a:effectRef>
+          <a:fontRef idx="minor">
+            <a:schemeClr val="tx1"/>
+          </a:fontRef>
+        </p:style>
+      </p:cxnSp>
+      <p:sp>
+        <p:nvSpPr>
+          <p:cNvPr id="30" name="Tekstvak 78">
+            <a:extLst>
+              <a:ext uri="{FF2B5EF4-FFF2-40B4-BE49-F238E27FC236}">
+                <a16:creationId xmlns:a16="http://schemas.microsoft.com/office/drawing/2014/main" id="{501B623C-E692-457B-A78B-0123F4148F94}"/>
+              </a:ext>
+            </a:extLst>
+          </p:cNvPr>
+          <p:cNvSpPr txBox="1"/>
+          <p:nvPr/>
+        </p:nvSpPr>
+        <p:spPr>
+          <a:xfrm>
+            <a:off x="6115763" y="4961868"/>
+            <a:ext cx="296876" cy="369332"/>
+          </a:xfrm>
+          <a:prstGeom prst="rect">
+            <a:avLst/>
+          </a:prstGeom>
+          <a:noFill/>
+        </p:spPr>
+        <p:txBody>
+          <a:bodyPr wrap="none" rtlCol="0">
+            <a:spAutoFit/>
+          </a:bodyPr>
+          <a:lstStyle/>
+          <a:p>
+            <a:r>
+              <a:rPr lang="nl-BE" dirty="0"/>
+              <a:t>Y</a:t>
+            </a:r>
+          </a:p>
+        </p:txBody>
+      </p:sp>
+      <p:cxnSp>
+        <p:nvCxnSpPr>
+          <p:cNvPr id="31" name="Verbindingslijn: gebogen 83">
+            <a:extLst>
+              <a:ext uri="{FF2B5EF4-FFF2-40B4-BE49-F238E27FC236}">
+                <a16:creationId xmlns:a16="http://schemas.microsoft.com/office/drawing/2014/main" id="{2EAE9257-0853-4C13-99E6-66153DB8E6F3}"/>
+              </a:ext>
+            </a:extLst>
+          </p:cNvPr>
+          <p:cNvCxnSpPr>
+            <a:stCxn id="15" idx="0"/>
+            <a:endCxn id="12" idx="1"/>
+          </p:cNvCxnSpPr>
+          <p:nvPr/>
+        </p:nvCxnSpPr>
+        <p:spPr>
+          <a:xfrm rot="5400000" flipH="1" flipV="1">
+            <a:off x="3240433" y="1476568"/>
+            <a:ext cx="1735276" cy="1517443"/>
+          </a:xfrm>
+          <a:prstGeom prst="bentConnector2">
+            <a:avLst/>
+          </a:prstGeom>
+          <a:ln>
+            <a:tailEnd type="triangle"/>
+          </a:ln>
+        </p:spPr>
+        <p:style>
+          <a:lnRef idx="1">
+            <a:schemeClr val="accent1"/>
+          </a:lnRef>
+          <a:fillRef idx="0">
+            <a:schemeClr val="accent1"/>
+          </a:fillRef>
+          <a:effectRef idx="0">
+            <a:schemeClr val="accent1"/>
+          </a:effectRef>
+          <a:fontRef idx="minor">
+            <a:schemeClr val="tx1"/>
+          </a:fontRef>
+        </p:style>
+      </p:cxnSp>
+      <p:cxnSp>
+        <p:nvCxnSpPr>
+          <p:cNvPr id="32" name="Verbindingslijn: gebogen 89">
+            <a:extLst>
+              <a:ext uri="{FF2B5EF4-FFF2-40B4-BE49-F238E27FC236}">
+                <a16:creationId xmlns:a16="http://schemas.microsoft.com/office/drawing/2014/main" id="{91E088C8-3D3B-424E-8225-5A4D3E292AA7}"/>
+              </a:ext>
+            </a:extLst>
+          </p:cNvPr>
+          <p:cNvCxnSpPr>
+            <a:stCxn id="22" idx="3"/>
+            <a:endCxn id="12" idx="3"/>
+          </p:cNvCxnSpPr>
+          <p:nvPr/>
+        </p:nvCxnSpPr>
+        <p:spPr>
+          <a:xfrm flipH="1" flipV="1">
+            <a:off x="7292906" y="1367651"/>
+            <a:ext cx="11161" cy="4309277"/>
+          </a:xfrm>
+          <a:prstGeom prst="bentConnector3">
+            <a:avLst>
+              <a:gd name="adj1" fmla="val -7396291"/>
+            </a:avLst>
+          </a:prstGeom>
+          <a:ln>
+            <a:tailEnd type="triangle"/>
+          </a:ln>
+        </p:spPr>
+        <p:style>
+          <a:lnRef idx="1">
+            <a:schemeClr val="accent1"/>
+          </a:lnRef>
+          <a:fillRef idx="0">
+            <a:schemeClr val="accent1"/>
+          </a:fillRef>
+          <a:effectRef idx="0">
+            <a:schemeClr val="accent1"/>
+          </a:effectRef>
+          <a:fontRef idx="minor">
+            <a:schemeClr val="tx1"/>
+          </a:fontRef>
+        </p:style>
+      </p:cxnSp>
     </p:spTree>
     <p:extLst>
       <p:ext uri="{BB962C8B-B14F-4D97-AF65-F5344CB8AC3E}">

</xml_diff>